<commit_message>
rimosso riferimento a Got nella presentazione
</commit_message>
<xml_diff>
--- a/PRESENTAZIONE_TESI/presentazione_agostini_stefano.pptx
+++ b/PRESENTAZIONE_TESI/presentazione_agostini_stefano.pptx
@@ -10766,7 +10766,7 @@
         <p:spPr>
           <a:xfrm>
             <a:off x="1619672" y="1352957"/>
-            <a:ext cx="7524328" cy="5355312"/>
+            <a:ext cx="7524328" cy="4801314"/>
           </a:xfrm>
           <a:prstGeom prst="rect">
             <a:avLst/>
@@ -11198,47 +11198,9 @@
               <a:t>più vecchi di una settimana</a:t>
             </a:r>
             <a:r>
-              <a:rPr lang="it-IT" dirty="0">
+              <a:rPr lang="it-IT" dirty="0" smtClean="0">
                 <a:latin typeface="Calibri" panose="020F0502020204030204" pitchFamily="34" charset="0"/>
                 <a:cs typeface="Calibri" panose="020F0502020204030204" pitchFamily="34" charset="0"/>
-              </a:rPr>
-              <a:t>. </a:t>
-            </a:r>
-          </a:p>
-          <a:p>
-            <a:pPr algn="just"/>
-            <a:r>
-              <a:rPr lang="it-IT" dirty="0">
-                <a:latin typeface="Calibri" panose="020F0502020204030204" pitchFamily="34" charset="0"/>
-                <a:cs typeface="Calibri" panose="020F0502020204030204" pitchFamily="34" charset="0"/>
-                <a:sym typeface="Wingdings" panose="05000000000000000000" pitchFamily="2" charset="2"/>
-              </a:rPr>
-              <a:t>      Questa limitazione è stata superata attraverso l’ausilio della libreria</a:t>
-            </a:r>
-          </a:p>
-          <a:p>
-            <a:pPr algn="just"/>
-            <a:r>
-              <a:rPr lang="it-IT" dirty="0">
-                <a:latin typeface="Calibri" panose="020F0502020204030204" pitchFamily="34" charset="0"/>
-                <a:cs typeface="Calibri" panose="020F0502020204030204" pitchFamily="34" charset="0"/>
-                <a:sym typeface="Wingdings" panose="05000000000000000000" pitchFamily="2" charset="2"/>
-              </a:rPr>
-              <a:t>      </a:t>
-            </a:r>
-            <a:r>
-              <a:rPr lang="it-IT" b="1" i="1" dirty="0" err="1">
-                <a:latin typeface="Calibri" panose="020F0502020204030204" pitchFamily="34" charset="0"/>
-                <a:cs typeface="Calibri" panose="020F0502020204030204" pitchFamily="34" charset="0"/>
-                <a:sym typeface="Wingdings" panose="05000000000000000000" pitchFamily="2" charset="2"/>
-              </a:rPr>
-              <a:t>GetOldTweets</a:t>
-            </a:r>
-            <a:r>
-              <a:rPr lang="it-IT" i="1" dirty="0">
-                <a:latin typeface="Calibri" panose="020F0502020204030204" pitchFamily="34" charset="0"/>
-                <a:cs typeface="Calibri" panose="020F0502020204030204" pitchFamily="34" charset="0"/>
-                <a:sym typeface="Wingdings" panose="05000000000000000000" pitchFamily="2" charset="2"/>
               </a:rPr>
               <a:t>.</a:t>
             </a:r>
@@ -11567,11 +11529,45 @@
               <a:buChar char="•"/>
             </a:pPr>
             <a:r>
+              <a:rPr lang="it-IT" b="1" i="1" dirty="0" err="1" smtClean="0">
+                <a:solidFill>
+                  <a:schemeClr val="accent1"/>
+                </a:solidFill>
+                <a:latin typeface="Calibri" panose="020F0502020204030204" pitchFamily="34" charset="0"/>
+                <a:cs typeface="Calibri" panose="020F0502020204030204" pitchFamily="34" charset="0"/>
+              </a:rPr>
+              <a:t>Tweepy</a:t>
+            </a:r>
+            <a:r>
+              <a:rPr lang="it-IT" b="1" i="1" dirty="0" smtClean="0">
+                <a:solidFill>
+                  <a:schemeClr val="accent1"/>
+                </a:solidFill>
+                <a:latin typeface="Calibri" panose="020F0502020204030204" pitchFamily="34" charset="0"/>
+                <a:cs typeface="Calibri" panose="020F0502020204030204" pitchFamily="34" charset="0"/>
+              </a:rPr>
+              <a:t> </a:t>
+            </a:r>
+            <a:r>
+              <a:rPr lang="it-IT" dirty="0" smtClean="0">
+                <a:latin typeface="Calibri" panose="020F0502020204030204" pitchFamily="34" charset="0"/>
+                <a:cs typeface="Calibri" panose="020F0502020204030204" pitchFamily="34" charset="0"/>
+              </a:rPr>
+              <a:t>g</a:t>
+            </a:r>
+            <a:r>
+              <a:rPr lang="it-IT" dirty="0" smtClean="0">
+                <a:latin typeface="Calibri" panose="020F0502020204030204" pitchFamily="34" charset="0"/>
+                <a:cs typeface="Calibri" panose="020F0502020204030204" pitchFamily="34" charset="0"/>
+              </a:rPr>
+              <a:t>estisce </a:t>
+            </a:r>
+            <a:r>
               <a:rPr lang="it-IT" dirty="0">
                 <a:latin typeface="Calibri" panose="020F0502020204030204" pitchFamily="34" charset="0"/>
                 <a:cs typeface="Calibri" panose="020F0502020204030204" pitchFamily="34" charset="0"/>
               </a:rPr>
-              <a:t>Gestisce il processo di autenticazione dello sviluppatore presso il </a:t>
+              <a:t>il processo di autenticazione dello sviluppatore presso </a:t>
             </a:r>
             <a:endParaRPr lang="it-IT" dirty="0" smtClean="0">
               <a:latin typeface="Calibri" panose="020F0502020204030204" pitchFamily="34" charset="0"/>
@@ -11592,7 +11588,14 @@
                 <a:latin typeface="Calibri" panose="020F0502020204030204" pitchFamily="34" charset="0"/>
                 <a:cs typeface="Calibri" panose="020F0502020204030204" pitchFamily="34" charset="0"/>
               </a:rPr>
-              <a:t>     server </a:t>
+              <a:t>    </a:t>
+            </a:r>
+            <a:r>
+              <a:rPr lang="it-IT" dirty="0" smtClean="0">
+                <a:latin typeface="Calibri" panose="020F0502020204030204" pitchFamily="34" charset="0"/>
+                <a:cs typeface="Calibri" panose="020F0502020204030204" pitchFamily="34" charset="0"/>
+              </a:rPr>
+              <a:t>il server </a:t>
             </a:r>
             <a:r>
               <a:rPr lang="it-IT" dirty="0">
@@ -11824,7 +11827,7 @@
         </p:nvSpPr>
         <p:spPr>
           <a:xfrm>
-            <a:off x="7884368" y="5805264"/>
+            <a:off x="7668344" y="5661248"/>
             <a:ext cx="864096" cy="504056"/>
           </a:xfrm>
           <a:prstGeom prst="rightArrow">
@@ -11994,7 +11997,7 @@
         <p:spPr>
           <a:xfrm>
             <a:off x="1619672" y="1352957"/>
-            <a:ext cx="7524328" cy="3416320"/>
+            <a:ext cx="7524328" cy="3693319"/>
           </a:xfrm>
           <a:prstGeom prst="rect">
             <a:avLst/>
@@ -12011,32 +12014,11 @@
               <a:buChar char="•"/>
             </a:pPr>
             <a:r>
-              <a:rPr lang="it-IT" dirty="0">
+              <a:rPr lang="it-IT" dirty="0" smtClean="0">
                 <a:latin typeface="Calibri" panose="020F0502020204030204" pitchFamily="34" charset="0"/>
                 <a:cs typeface="Calibri" panose="020F0502020204030204" pitchFamily="34" charset="0"/>
               </a:rPr>
-              <a:t>La libreria </a:t>
-            </a:r>
-            <a:r>
-              <a:rPr lang="it-IT" b="1" i="1" dirty="0" err="1">
-                <a:latin typeface="Calibri" panose="020F0502020204030204" pitchFamily="34" charset="0"/>
-                <a:cs typeface="Calibri" panose="020F0502020204030204" pitchFamily="34" charset="0"/>
-              </a:rPr>
-              <a:t>GetOldTweets</a:t>
-            </a:r>
-            <a:r>
-              <a:rPr lang="it-IT" i="1" dirty="0">
-                <a:latin typeface="Calibri" panose="020F0502020204030204" pitchFamily="34" charset="0"/>
-                <a:cs typeface="Calibri" panose="020F0502020204030204" pitchFamily="34" charset="0"/>
-              </a:rPr>
-              <a:t> </a:t>
-            </a:r>
-            <a:r>
-              <a:rPr lang="it-IT" dirty="0">
-                <a:latin typeface="Calibri" panose="020F0502020204030204" pitchFamily="34" charset="0"/>
-                <a:cs typeface="Calibri" panose="020F0502020204030204" pitchFamily="34" charset="0"/>
-              </a:rPr>
-              <a:t>permette di </a:t>
+              <a:t>Bisogna </a:t>
             </a:r>
             <a:r>
               <a:rPr lang="it-IT" i="1" dirty="0">
@@ -12067,7 +12049,42 @@
                 <a:latin typeface="Calibri" panose="020F0502020204030204" pitchFamily="34" charset="0"/>
                 <a:cs typeface="Calibri" panose="020F0502020204030204" pitchFamily="34" charset="0"/>
               </a:rPr>
-              <a:t>ufficiale e di </a:t>
+              <a:t>ufficiale </a:t>
+            </a:r>
+            <a:r>
+              <a:rPr lang="it-IT" dirty="0" smtClean="0">
+                <a:latin typeface="Calibri" panose="020F0502020204030204" pitchFamily="34" charset="0"/>
+                <a:cs typeface="Calibri" panose="020F0502020204030204" pitchFamily="34" charset="0"/>
+              </a:rPr>
+              <a:t>per</a:t>
+            </a:r>
+            <a:r>
+              <a:rPr lang="it-IT" dirty="0" smtClean="0">
+                <a:latin typeface="Calibri" panose="020F0502020204030204" pitchFamily="34" charset="0"/>
+                <a:cs typeface="Calibri" panose="020F0502020204030204" pitchFamily="34" charset="0"/>
+              </a:rPr>
+              <a:t> recuperare </a:t>
+            </a:r>
+            <a:r>
+              <a:rPr lang="it-IT" i="1" dirty="0" err="1" smtClean="0">
+                <a:latin typeface="Calibri" panose="020F0502020204030204" pitchFamily="34" charset="0"/>
+                <a:cs typeface="Calibri" panose="020F0502020204030204" pitchFamily="34" charset="0"/>
+              </a:rPr>
+              <a:t>tweets</a:t>
+            </a:r>
+            <a:r>
+              <a:rPr lang="it-IT" i="1" dirty="0" smtClean="0">
+                <a:latin typeface="Calibri" panose="020F0502020204030204" pitchFamily="34" charset="0"/>
+                <a:cs typeface="Calibri" panose="020F0502020204030204" pitchFamily="34" charset="0"/>
+              </a:rPr>
+              <a:t> </a:t>
+            </a:r>
+            <a:r>
+              <a:rPr lang="it-IT" dirty="0">
+                <a:latin typeface="Calibri" panose="020F0502020204030204" pitchFamily="34" charset="0"/>
+                <a:cs typeface="Calibri" panose="020F0502020204030204" pitchFamily="34" charset="0"/>
+              </a:rPr>
+              <a:t>più vecchi di </a:t>
             </a:r>
             <a:endParaRPr lang="it-IT" dirty="0" smtClean="0">
               <a:latin typeface="Calibri" panose="020F0502020204030204" pitchFamily="34" charset="0"/>
@@ -12087,31 +12104,62 @@
                 <a:latin typeface="Calibri" panose="020F0502020204030204" pitchFamily="34" charset="0"/>
                 <a:cs typeface="Calibri" panose="020F0502020204030204" pitchFamily="34" charset="0"/>
               </a:rPr>
-              <a:t>     ottenere </a:t>
-            </a:r>
-            <a:r>
-              <a:rPr lang="it-IT" i="1" dirty="0" err="1" smtClean="0">
+              <a:t>     </a:t>
+            </a:r>
+            <a:r>
+              <a:rPr lang="it-IT" dirty="0" smtClean="0">
                 <a:latin typeface="Calibri" panose="020F0502020204030204" pitchFamily="34" charset="0"/>
                 <a:cs typeface="Calibri" panose="020F0502020204030204" pitchFamily="34" charset="0"/>
               </a:rPr>
-              <a:t>tweets</a:t>
-            </a:r>
-            <a:r>
-              <a:rPr lang="it-IT" i="1" dirty="0" smtClean="0">
+              <a:t>una settimana, altrimenti è impossibile ottenere </a:t>
+            </a:r>
+            <a:r>
+              <a:rPr lang="it-IT" b="1" i="1" dirty="0" err="1" smtClean="0">
+                <a:solidFill>
+                  <a:srgbClr val="C00000"/>
+                </a:solidFill>
                 <a:latin typeface="Calibri" panose="020F0502020204030204" pitchFamily="34" charset="0"/>
                 <a:cs typeface="Calibri" panose="020F0502020204030204" pitchFamily="34" charset="0"/>
               </a:rPr>
-              <a:t> </a:t>
-            </a:r>
-            <a:r>
-              <a:rPr lang="it-IT" dirty="0">
+              <a:t>endorsement</a:t>
+            </a:r>
+            <a:r>
+              <a:rPr lang="it-IT" b="1" i="1" dirty="0" smtClean="0">
+                <a:solidFill>
+                  <a:srgbClr val="C00000"/>
+                </a:solidFill>
                 <a:latin typeface="Calibri" panose="020F0502020204030204" pitchFamily="34" charset="0"/>
                 <a:cs typeface="Calibri" panose="020F0502020204030204" pitchFamily="34" charset="0"/>
               </a:rPr>
-              <a:t>più vecchi di una settimana.</a:t>
-            </a:r>
-          </a:p>
-          <a:p>
+              <a:t> </a:t>
+            </a:r>
+            <a:r>
+              <a:rPr lang="it-IT" b="1" i="1" dirty="0" err="1" smtClean="0">
+                <a:solidFill>
+                  <a:srgbClr val="C00000"/>
+                </a:solidFill>
+                <a:latin typeface="Calibri" panose="020F0502020204030204" pitchFamily="34" charset="0"/>
+                <a:cs typeface="Calibri" panose="020F0502020204030204" pitchFamily="34" charset="0"/>
+              </a:rPr>
+              <a:t>graphs</a:t>
+            </a:r>
+            <a:endParaRPr lang="it-IT" dirty="0">
+              <a:solidFill>
+                <a:srgbClr val="C00000"/>
+              </a:solidFill>
+              <a:latin typeface="Calibri" panose="020F0502020204030204" pitchFamily="34" charset="0"/>
+              <a:cs typeface="Calibri" panose="020F0502020204030204" pitchFamily="34" charset="0"/>
+            </a:endParaRPr>
+          </a:p>
+          <a:p>
+            <a:r>
+              <a:rPr lang="it-IT" dirty="0" smtClean="0">
+                <a:latin typeface="Calibri" panose="020F0502020204030204" pitchFamily="34" charset="0"/>
+                <a:cs typeface="Calibri" panose="020F0502020204030204" pitchFamily="34" charset="0"/>
+                <a:sym typeface="Wingdings" panose="05000000000000000000" pitchFamily="2" charset="2"/>
+              </a:rPr>
+              <a:t>      di dimensioni sufficienti per un’analisi attendibile.  </a:t>
+            </a:r>
             <a:endParaRPr lang="it-IT" dirty="0">
               <a:latin typeface="Calibri" panose="020F0502020204030204" pitchFamily="34" charset="0"/>
               <a:cs typeface="Calibri" panose="020F0502020204030204" pitchFamily="34" charset="0"/>
@@ -12119,6 +12167,13 @@
             </a:endParaRPr>
           </a:p>
           <a:p>
+            <a:endParaRPr lang="it-IT" dirty="0" smtClean="0">
+              <a:latin typeface="Calibri" panose="020F0502020204030204" pitchFamily="34" charset="0"/>
+              <a:cs typeface="Calibri" panose="020F0502020204030204" pitchFamily="34" charset="0"/>
+              <a:sym typeface="Wingdings" panose="05000000000000000000" pitchFamily="2" charset="2"/>
+            </a:endParaRPr>
+          </a:p>
+          <a:p>
             <a:endParaRPr lang="it-IT" dirty="0">
               <a:latin typeface="Calibri" panose="020F0502020204030204" pitchFamily="34" charset="0"/>
               <a:cs typeface="Calibri" panose="020F0502020204030204" pitchFamily="34" charset="0"/>
@@ -12135,7 +12190,28 @@
                 <a:latin typeface="Calibri" panose="020F0502020204030204" pitchFamily="34" charset="0"/>
                 <a:cs typeface="Calibri" panose="020F0502020204030204" pitchFamily="34" charset="0"/>
               </a:rPr>
-              <a:t>Sfrutta la funzione </a:t>
+              <a:t>I</a:t>
+            </a:r>
+            <a:r>
+              <a:rPr lang="it-IT" dirty="0" smtClean="0">
+                <a:latin typeface="Calibri" panose="020F0502020204030204" pitchFamily="34" charset="0"/>
+                <a:cs typeface="Calibri" panose="020F0502020204030204" pitchFamily="34" charset="0"/>
+              </a:rPr>
+              <a:t>mitare</a:t>
+            </a:r>
+            <a:r>
+              <a:rPr lang="it-IT" dirty="0" smtClean="0">
+                <a:latin typeface="Calibri" panose="020F0502020204030204" pitchFamily="34" charset="0"/>
+                <a:cs typeface="Calibri" panose="020F0502020204030204" pitchFamily="34" charset="0"/>
+              </a:rPr>
+              <a:t> </a:t>
+            </a:r>
+            <a:r>
+              <a:rPr lang="it-IT" dirty="0">
+                <a:latin typeface="Calibri" panose="020F0502020204030204" pitchFamily="34" charset="0"/>
+                <a:cs typeface="Calibri" panose="020F0502020204030204" pitchFamily="34" charset="0"/>
+              </a:rPr>
+              <a:t>la funzione </a:t>
             </a:r>
             <a:r>
               <a:rPr lang="it-IT" i="1" dirty="0">
@@ -12201,7 +12277,23 @@
                 <a:cs typeface="Calibri" panose="020F0502020204030204" pitchFamily="34" charset="0"/>
                 <a:sym typeface="Wingdings" panose="05000000000000000000" pitchFamily="2" charset="2"/>
               </a:rPr>
-              <a:t>Tramite chiamate successive ad un provider </a:t>
+              <a:t>Tramite chiamate successive ad un </a:t>
+            </a:r>
+            <a:r>
+              <a:rPr lang="it-IT" i="1" dirty="0">
+                <a:latin typeface="Calibri" panose="020F0502020204030204" pitchFamily="34" charset="0"/>
+                <a:cs typeface="Calibri" panose="020F0502020204030204" pitchFamily="34" charset="0"/>
+                <a:sym typeface="Wingdings" panose="05000000000000000000" pitchFamily="2" charset="2"/>
+              </a:rPr>
+              <a:t>provider</a:t>
+            </a:r>
+            <a:r>
+              <a:rPr lang="it-IT" dirty="0">
+                <a:latin typeface="Calibri" panose="020F0502020204030204" pitchFamily="34" charset="0"/>
+                <a:cs typeface="Calibri" panose="020F0502020204030204" pitchFamily="34" charset="0"/>
+                <a:sym typeface="Wingdings" panose="05000000000000000000" pitchFamily="2" charset="2"/>
+              </a:rPr>
+              <a:t> </a:t>
             </a:r>
             <a:r>
               <a:rPr lang="it-IT" b="1" i="1" dirty="0">
@@ -12217,7 +12309,23 @@
                 <a:cs typeface="Calibri" panose="020F0502020204030204" pitchFamily="34" charset="0"/>
                 <a:sym typeface="Wingdings" panose="05000000000000000000" pitchFamily="2" charset="2"/>
               </a:rPr>
-              <a:t> ottiene </a:t>
+              <a:t> </a:t>
+            </a:r>
+            <a:r>
+              <a:rPr lang="it-IT" dirty="0" smtClean="0">
+                <a:latin typeface="Calibri" panose="020F0502020204030204" pitchFamily="34" charset="0"/>
+                <a:cs typeface="Calibri" panose="020F0502020204030204" pitchFamily="34" charset="0"/>
+                <a:sym typeface="Wingdings" panose="05000000000000000000" pitchFamily="2" charset="2"/>
+              </a:rPr>
+              <a:t>si ottengono</a:t>
+            </a:r>
+            <a:r>
+              <a:rPr lang="it-IT" dirty="0" smtClean="0">
+                <a:latin typeface="Calibri" panose="020F0502020204030204" pitchFamily="34" charset="0"/>
+                <a:cs typeface="Calibri" panose="020F0502020204030204" pitchFamily="34" charset="0"/>
+                <a:sym typeface="Wingdings" panose="05000000000000000000" pitchFamily="2" charset="2"/>
+              </a:rPr>
+              <a:t> </a:t>
             </a:r>
             <a:r>
               <a:rPr lang="it-IT" dirty="0" err="1">
@@ -12306,12 +12414,28 @@
               <a:buChar char="•"/>
             </a:pPr>
             <a:r>
+              <a:rPr lang="it-IT" dirty="0" smtClean="0">
+                <a:latin typeface="Calibri" panose="020F0502020204030204" pitchFamily="34" charset="0"/>
+                <a:cs typeface="Calibri" panose="020F0502020204030204" pitchFamily="34" charset="0"/>
+                <a:sym typeface="Wingdings" panose="05000000000000000000" pitchFamily="2" charset="2"/>
+              </a:rPr>
+              <a:t>Si r</a:t>
+            </a:r>
+            <a:r>
+              <a:rPr lang="it-IT" dirty="0" smtClean="0">
+                <a:latin typeface="Calibri" panose="020F0502020204030204" pitchFamily="34" charset="0"/>
+                <a:cs typeface="Calibri" panose="020F0502020204030204" pitchFamily="34" charset="0"/>
+                <a:sym typeface="Wingdings" panose="05000000000000000000" pitchFamily="2" charset="2"/>
+              </a:rPr>
+              <a:t>iesce </a:t>
+            </a:r>
+            <a:r>
               <a:rPr lang="it-IT" dirty="0">
                 <a:latin typeface="Calibri" panose="020F0502020204030204" pitchFamily="34" charset="0"/>
                 <a:cs typeface="Calibri" panose="020F0502020204030204" pitchFamily="34" charset="0"/>
                 <a:sym typeface="Wingdings" panose="05000000000000000000" pitchFamily="2" charset="2"/>
               </a:rPr>
-              <a:t>Riesce quindi ad evitare le limitazioni temporali delle </a:t>
+              <a:t>quindi ad evitare le limitazioni temporali delle </a:t>
             </a:r>
             <a:r>
               <a:rPr lang="it-IT" b="1" i="1" dirty="0">
@@ -39061,7 +39185,7 @@
         </p:nvSpPr>
         <p:spPr>
           <a:xfrm>
-            <a:off x="2411760" y="1949834"/>
+            <a:off x="2411760" y="1772816"/>
             <a:ext cx="5730095" cy="2554545"/>
           </a:xfrm>
           <a:prstGeom prst="rect">
@@ -41734,7 +41858,7 @@
         </p:nvSpPr>
         <p:spPr>
           <a:xfrm>
-            <a:off x="3635896" y="3584049"/>
+            <a:off x="3419872" y="3584049"/>
             <a:ext cx="1221809" cy="276999"/>
           </a:xfrm>
           <a:prstGeom prst="rect">
@@ -41792,7 +41916,7 @@
         </p:nvSpPr>
         <p:spPr>
           <a:xfrm>
-            <a:off x="4788024" y="3584048"/>
+            <a:off x="4860032" y="3584048"/>
             <a:ext cx="1221809" cy="276999"/>
           </a:xfrm>
           <a:prstGeom prst="rect">
@@ -41948,8 +42072,8 @@
           </a:p>
         </p:txBody>
       </p:sp>
-      <mc:AlternateContent xmlns:mc="http://schemas.openxmlformats.org/markup-compatibility/2006">
-        <mc:Choice xmlns:a14="http://schemas.microsoft.com/office/drawing/2010/main" Requires="a14">
+      <mc:AlternateContent xmlns:mc="http://schemas.openxmlformats.org/markup-compatibility/2006" xmlns:a14="http://schemas.microsoft.com/office/drawing/2010/main">
+        <mc:Choice Requires="a14">
           <p:sp>
             <p:nvSpPr>
               <p:cNvPr id="6" name="Rettangolo 5">
@@ -42540,7 +42664,7 @@
             </p:txBody>
           </p:sp>
         </mc:Choice>
-        <mc:Fallback>
+        <mc:Fallback xmlns="">
           <p:sp>
             <p:nvSpPr>
               <p:cNvPr id="6" name="Rettangolo 5">

</xml_diff>